<commit_message>
Replace Module Repository + Ivy with MMM
</commit_message>
<xml_diff>
--- a/Tutorials/images/qa_resources-v3.pptx
+++ b/Tutorials/images/qa_resources-v3.pptx
@@ -240,7 +240,7 @@
               <a:rPr lang="fr-FR" smtClean="0">
                 <a:latin typeface="Calibri Regular" charset="0"/>
               </a:rPr>
-              <a:t>28/09/2020</a:t>
+              <a:t>29/09/2020</a:t>
             </a:fld>
             <a:endParaRPr lang="en-US" dirty="0">
               <a:latin typeface="Calibri Regular" charset="0"/>
@@ -428,7 +428,7 @@
           <a:p>
             <a:fld id="{D125E8DA-58CB-F841-A404-E11EC1E2C988}" type="datetime1">
               <a:rPr lang="fr-FR" smtClean="0"/>
-              <a:t>28/09/2020</a:t>
+              <a:t>29/09/2020</a:t>
             </a:fld>
             <a:endParaRPr lang="en-US" dirty="0"/>
           </a:p>
@@ -33584,8 +33584,8 @@
         </p:nvSpPr>
         <p:spPr>
           <a:xfrm>
-            <a:off x="2855639" y="3026233"/>
-            <a:ext cx="1872209" cy="324374"/>
+            <a:off x="2855638" y="3025295"/>
+            <a:ext cx="1872209" cy="809435"/>
           </a:xfrm>
           <a:prstGeom prst="roundRect">
             <a:avLst>
@@ -33630,10 +33630,13 @@
                 <a:ea typeface="Source Sans Pro Semibold" charset="0"/>
                 <a:cs typeface="Source Sans Pro Light" charset="0"/>
               </a:rPr>
-              <a:t>Module</a:t>
-            </a:r>
-            <a:r>
-              <a:rPr lang="en-US" sz="1400" b="1" i="1">
+              <a:t>MicroEJ Module</a:t>
+            </a:r>
+          </a:p>
+          <a:p>
+            <a:pPr algn="ctr"/>
+            <a:r>
+              <a:rPr lang="en-US" sz="1400" b="1">
                 <a:solidFill>
                   <a:schemeClr val="bg1"/>
                 </a:solidFill>
@@ -33641,8 +33644,11 @@
                 <a:ea typeface="Source Sans Pro Semibold" charset="0"/>
                 <a:cs typeface="Source Sans Pro Light" charset="0"/>
               </a:rPr>
-              <a:t> </a:t>
-            </a:r>
+              <a:t>Manager</a:t>
+            </a:r>
+          </a:p>
+          <a:p>
+            <a:pPr algn="ctr"/>
             <a:r>
               <a:rPr lang="en-US" sz="1400" b="1">
                 <a:solidFill>
@@ -33652,7 +33658,7 @@
                 <a:ea typeface="Source Sans Pro Semibold" charset="0"/>
                 <a:cs typeface="Source Sans Pro Light" charset="0"/>
               </a:rPr>
-              <a:t>Repository</a:t>
+              <a:t>(MMM)</a:t>
             </a:r>
           </a:p>
         </p:txBody>
@@ -33695,71 +33701,6 @@
       </p:pic>
       <p:sp>
         <p:nvSpPr>
-          <p:cNvPr id="104" name="Rounded Rectangle 114">
-            <a:extLst>
-              <a:ext uri="{FF2B5EF4-FFF2-40B4-BE49-F238E27FC236}">
-                <a16:creationId xmlns:a16="http://schemas.microsoft.com/office/drawing/2014/main" id="{E5EAF111-F798-4E7F-9EAD-FE8DE1482D14}"/>
-              </a:ext>
-            </a:extLst>
-          </p:cNvPr>
-          <p:cNvSpPr/>
-          <p:nvPr/>
-        </p:nvSpPr>
-        <p:spPr>
-          <a:xfrm>
-            <a:off x="2855639" y="3480730"/>
-            <a:ext cx="1872209" cy="324374"/>
-          </a:xfrm>
-          <a:prstGeom prst="roundRect">
-            <a:avLst>
-              <a:gd name="adj" fmla="val 19644"/>
-            </a:avLst>
-          </a:prstGeom>
-          <a:noFill/>
-          <a:ln w="28575">
-            <a:solidFill>
-              <a:srgbClr val="EE502E"/>
-            </a:solidFill>
-          </a:ln>
-          <a:effectLst/>
-        </p:spPr>
-        <p:style>
-          <a:lnRef idx="2">
-            <a:schemeClr val="dk1"/>
-          </a:lnRef>
-          <a:fillRef idx="1">
-            <a:schemeClr val="lt1"/>
-          </a:fillRef>
-          <a:effectRef idx="0">
-            <a:schemeClr val="dk1"/>
-          </a:effectRef>
-          <a:fontRef idx="minor">
-            <a:schemeClr val="dk1"/>
-          </a:fontRef>
-        </p:style>
-        <p:txBody>
-          <a:bodyPr wrap="square" tIns="36000" bIns="36000" rtlCol="0" anchor="ctr">
-            <a:spAutoFit/>
-          </a:bodyPr>
-          <a:lstStyle/>
-          <a:p>
-            <a:pPr algn="ctr"/>
-            <a:r>
-              <a:rPr lang="en-US" sz="1400" b="1">
-                <a:solidFill>
-                  <a:schemeClr val="bg1"/>
-                </a:solidFill>
-                <a:latin typeface="Source Sans Pro Semibold" charset="0"/>
-                <a:ea typeface="Source Sans Pro Semibold" charset="0"/>
-                <a:cs typeface="Source Sans Pro Light" charset="0"/>
-              </a:rPr>
-              <a:t>Ivy Settings</a:t>
-            </a:r>
-          </a:p>
-        </p:txBody>
-      </p:sp>
-      <p:sp>
-        <p:nvSpPr>
           <p:cNvPr id="117" name="TextBox 116">
             <a:extLst>
               <a:ext uri="{FF2B5EF4-FFF2-40B4-BE49-F238E27FC236}">
@@ -34436,14 +34377,15 @@
             </a:extLst>
           </p:cNvPr>
           <p:cNvCxnSpPr>
+            <a:cxnSpLocks/>
             <a:stCxn id="25" idx="1"/>
           </p:cNvCxnSpPr>
           <p:nvPr/>
         </p:nvCxnSpPr>
         <p:spPr>
-          <a:xfrm flipH="1" flipV="1">
-            <a:off x="4747505" y="3259228"/>
-            <a:ext cx="3267424" cy="96170"/>
+          <a:xfrm flipH="1">
+            <a:off x="4776509" y="3355398"/>
+            <a:ext cx="3238420" cy="0"/>
           </a:xfrm>
           <a:prstGeom prst="straightConnector1">
             <a:avLst/>
@@ -34657,8 +34599,8 @@
         </p:nvSpPr>
         <p:spPr>
           <a:xfrm>
-            <a:off x="4968865" y="3047221"/>
-            <a:ext cx="1969074" cy="446276"/>
+            <a:off x="5192691" y="3123006"/>
+            <a:ext cx="2822238" cy="184666"/>
           </a:xfrm>
           <a:prstGeom prst="rect">
             <a:avLst/>
@@ -34671,7 +34613,7 @@
           </a:bodyPr>
           <a:lstStyle/>
           <a:p>
-            <a:pPr algn="ctr">
+            <a:pPr>
               <a:spcBef>
                 <a:spcPts val="0"/>
               </a:spcBef>
@@ -34691,18 +34633,8 @@
                 <a:ea typeface="Source Sans Pro Light" charset="0"/>
                 <a:cs typeface="Source Sans Pro Light" charset="0"/>
               </a:rPr>
-              <a:t>Import offline repository</a:t>
-            </a:r>
-          </a:p>
-          <a:p>
-            <a:pPr algn="ctr">
-              <a:spcBef>
-                <a:spcPts val="0"/>
-              </a:spcBef>
-              <a:spcAft>
-                <a:spcPts val="600"/>
-              </a:spcAft>
-            </a:pPr>
+              <a:t>Import offline repository </a:t>
+            </a:r>
             <a:r>
               <a:rPr lang="en-US" sz="1200" b="1">
                 <a:solidFill>
@@ -34742,7 +34674,7 @@
         </p:nvSpPr>
         <p:spPr>
           <a:xfrm>
-            <a:off x="6104223" y="3798656"/>
+            <a:off x="5976868" y="4139978"/>
             <a:ext cx="1969074" cy="184666"/>
           </a:xfrm>
           <a:prstGeom prst="rect">
@@ -34888,18 +34820,17 @@
           </p:cNvPr>
           <p:cNvCxnSpPr>
             <a:cxnSpLocks/>
-            <a:stCxn id="25" idx="1"/>
           </p:cNvCxnSpPr>
           <p:nvPr/>
         </p:nvCxnSpPr>
         <p:spPr>
           <a:xfrm rot="10800000" flipV="1">
-            <a:off x="4776509" y="3355398"/>
-            <a:ext cx="3238421" cy="284378"/>
+            <a:off x="4776510" y="3471644"/>
+            <a:ext cx="3264258" cy="168131"/>
           </a:xfrm>
           <a:prstGeom prst="bentConnector3">
             <a:avLst>
-              <a:gd name="adj1" fmla="val 48235"/>
+              <a:gd name="adj1" fmla="val 42243"/>
             </a:avLst>
           </a:prstGeom>
           <a:ln w="28575">
@@ -34937,12 +34868,12 @@
         </p:nvCxnSpPr>
         <p:spPr>
           <a:xfrm rot="10800000">
-            <a:off x="4776511" y="3642917"/>
-            <a:ext cx="3773167" cy="446632"/>
+            <a:off x="4776509" y="3644681"/>
+            <a:ext cx="3773170" cy="444869"/>
           </a:xfrm>
           <a:prstGeom prst="bentConnector3">
             <a:avLst>
-              <a:gd name="adj1" fmla="val 55617"/>
+              <a:gd name="adj1" fmla="val 50000"/>
             </a:avLst>
           </a:prstGeom>
           <a:ln w="28575">

</xml_diff>

<commit_message>
Remove references to Ivy or artifacts
Use the term Module instead.
</commit_message>
<xml_diff>
--- a/Tutorials/images/qa_resources-v3.pptx
+++ b/Tutorials/images/qa_resources-v3.pptx
@@ -234,7 +234,7 @@
               <a:rPr lang="fr-FR" smtClean="0">
                 <a:latin typeface="Calibri Regular" charset="0"/>
               </a:rPr>
-              <a:t>29/09/2020</a:t>
+              <a:t>05/10/2020</a:t>
             </a:fld>
             <a:endParaRPr lang="en-US" dirty="0">
               <a:latin typeface="Calibri Regular" charset="0"/>
@@ -422,7 +422,7 @@
           <a:p>
             <a:fld id="{D125E8DA-58CB-F841-A404-E11EC1E2C988}" type="datetime1">
               <a:rPr lang="fr-FR" smtClean="0"/>
-              <a:t>29/09/2020</a:t>
+              <a:t>05/10/2020</a:t>
             </a:fld>
             <a:endParaRPr lang="en-US" dirty="0"/>
           </a:p>
@@ -4495,7 +4495,7 @@
           <a:p>
             <a:fld id="{198ED07F-DFCB-4ABE-A311-845A3D30E5DB}" type="datetime7">
               <a:rPr lang="en-US" smtClean="0"/>
-              <a:t>Sep-20</a:t>
+              <a:t>Oct-20</a:t>
             </a:fld>
             <a:endParaRPr lang="en-US" dirty="0"/>
           </a:p>
@@ -34630,6 +34630,20 @@
                 </a:spcAft>
               </a:pPr>
               <a:r>
+                <a:rPr lang="en-US" sz="1200" spc="0">
+                  <a:ln>
+                    <a:noFill/>
+                  </a:ln>
+                  <a:solidFill>
+                    <a:srgbClr val="EE502E"/>
+                  </a:solidFill>
+                  <a:latin typeface="Source Sans Pro Light" charset="0"/>
+                  <a:ea typeface="Source Sans Pro Light" charset="0"/>
+                  <a:cs typeface="Source Sans Pro Light" charset="0"/>
+                </a:rPr>
+                <a:t>Update Module </a:t>
+              </a:r>
+              <a:r>
                 <a:rPr lang="en-US" sz="1200" spc="0" dirty="0">
                   <a:ln>
                     <a:noFill/>
@@ -34641,7 +34655,7 @@
                   <a:ea typeface="Source Sans Pro Light" charset="0"/>
                   <a:cs typeface="Source Sans Pro Light" charset="0"/>
                 </a:rPr>
-                <a:t>Update Ivy Settings</a:t>
+                <a:t>Settings</a:t>
               </a:r>
             </a:p>
           </p:txBody>

</xml_diff>